<commit_message>
Add slide on presentation about survey
</commit_message>
<xml_diff>
--- a/apps/presentation-workshop.pptx
+++ b/apps/presentation-workshop.pptx
@@ -5,7 +5,7 @@
     <p:sldMasterId id="2147483684" r:id="rId1"/>
   </p:sldMasterIdLst>
   <p:notesMasterIdLst>
-    <p:notesMasterId r:id="rId20"/>
+    <p:notesMasterId r:id="rId21"/>
   </p:notesMasterIdLst>
   <p:sldIdLst>
     <p:sldId id="257" r:id="rId2"/>
@@ -16,16 +16,17 @@
     <p:sldId id="263" r:id="rId7"/>
     <p:sldId id="261" r:id="rId8"/>
     <p:sldId id="262" r:id="rId9"/>
-    <p:sldId id="266" r:id="rId10"/>
-    <p:sldId id="274" r:id="rId11"/>
-    <p:sldId id="275" r:id="rId12"/>
-    <p:sldId id="267" r:id="rId13"/>
-    <p:sldId id="268" r:id="rId14"/>
-    <p:sldId id="269" r:id="rId15"/>
-    <p:sldId id="270" r:id="rId16"/>
-    <p:sldId id="277" r:id="rId17"/>
-    <p:sldId id="264" r:id="rId18"/>
-    <p:sldId id="276" r:id="rId19"/>
+    <p:sldId id="278" r:id="rId10"/>
+    <p:sldId id="266" r:id="rId11"/>
+    <p:sldId id="274" r:id="rId12"/>
+    <p:sldId id="275" r:id="rId13"/>
+    <p:sldId id="267" r:id="rId14"/>
+    <p:sldId id="268" r:id="rId15"/>
+    <p:sldId id="269" r:id="rId16"/>
+    <p:sldId id="270" r:id="rId17"/>
+    <p:sldId id="277" r:id="rId18"/>
+    <p:sldId id="264" r:id="rId19"/>
+    <p:sldId id="276" r:id="rId20"/>
   </p:sldIdLst>
   <p:sldSz cx="12192000" cy="6858000"/>
   <p:notesSz cx="6858000" cy="9144000"/>
@@ -843,7 +844,7 @@
           <a:p>
             <a:fld id="{2635C640-9F38-774F-AC67-7388F926788E}" type="slidenum">
               <a:rPr lang="en-AU" smtClean="0"/>
-              <a:t>10</a:t>
+              <a:t>11</a:t>
             </a:fld>
             <a:endParaRPr lang="en-AU"/>
           </a:p>
@@ -3852,6 +3853,296 @@
         </p:nvSpPr>
         <p:spPr>
           <a:xfrm>
+            <a:off x="2101511" y="1988076"/>
+            <a:ext cx="2754216" cy="523220"/>
+          </a:xfrm>
+          <a:prstGeom prst="rect">
+            <a:avLst/>
+          </a:prstGeom>
+          <a:noFill/>
+        </p:spPr>
+        <p:txBody>
+          <a:bodyPr wrap="none" rtlCol="0">
+            <a:spAutoFit/>
+          </a:bodyPr>
+          <a:lstStyle/>
+          <a:p>
+            <a:r>
+              <a:rPr lang="en-AU" sz="2800" dirty="0" smtClean="0">
+                <a:solidFill>
+                  <a:schemeClr val="bg2">
+                    <a:lumMod val="20000"/>
+                    <a:lumOff val="80000"/>
+                  </a:schemeClr>
+                </a:solidFill>
+              </a:rPr>
+              <a:t>less</a:t>
+            </a:r>
+            <a:r>
+              <a:rPr lang="en-AU" sz="2800" dirty="0" smtClean="0">
+                <a:solidFill>
+                  <a:schemeClr val="accent3">
+                    <a:lumMod val="20000"/>
+                    <a:lumOff val="80000"/>
+                  </a:schemeClr>
+                </a:solidFill>
+              </a:rPr>
+              <a:t> </a:t>
+            </a:r>
+            <a:r>
+              <a:rPr lang="en-AU" sz="2800" dirty="0" smtClean="0"/>
+              <a:t>human error</a:t>
+            </a:r>
+          </a:p>
+        </p:txBody>
+      </p:sp>
+      <p:sp>
+        <p:nvSpPr>
+          <p:cNvPr id="6" name="TextBox 5"/>
+          <p:cNvSpPr txBox="1"/>
+          <p:nvPr/>
+        </p:nvSpPr>
+        <p:spPr>
+          <a:xfrm>
+            <a:off x="1371599" y="3138506"/>
+            <a:ext cx="4214039" cy="523220"/>
+          </a:xfrm>
+          <a:prstGeom prst="rect">
+            <a:avLst/>
+          </a:prstGeom>
+          <a:noFill/>
+        </p:spPr>
+        <p:txBody>
+          <a:bodyPr wrap="none" rtlCol="0">
+            <a:spAutoFit/>
+          </a:bodyPr>
+          <a:lstStyle/>
+          <a:p>
+            <a:r>
+              <a:rPr lang="en-AU" sz="2800" dirty="0" smtClean="0"/>
+              <a:t>there is </a:t>
+            </a:r>
+            <a:r>
+              <a:rPr lang="en-AU" sz="2800" dirty="0" smtClean="0">
+                <a:solidFill>
+                  <a:schemeClr val="bg2">
+                    <a:lumMod val="20000"/>
+                    <a:lumOff val="80000"/>
+                  </a:schemeClr>
+                </a:solidFill>
+              </a:rPr>
+              <a:t>constant feedback</a:t>
+            </a:r>
+            <a:endParaRPr lang="en-AU" sz="2800" dirty="0">
+              <a:solidFill>
+                <a:schemeClr val="bg2">
+                  <a:lumMod val="20000"/>
+                  <a:lumOff val="80000"/>
+                </a:schemeClr>
+              </a:solidFill>
+            </a:endParaRPr>
+          </a:p>
+        </p:txBody>
+      </p:sp>
+      <p:sp>
+        <p:nvSpPr>
+          <p:cNvPr id="7" name="TextBox 6"/>
+          <p:cNvSpPr txBox="1"/>
+          <p:nvPr/>
+        </p:nvSpPr>
+        <p:spPr>
+          <a:xfrm>
+            <a:off x="7200136" y="3321422"/>
+            <a:ext cx="3700052" cy="707886"/>
+          </a:xfrm>
+          <a:prstGeom prst="rect">
+            <a:avLst/>
+          </a:prstGeom>
+          <a:noFill/>
+        </p:spPr>
+        <p:txBody>
+          <a:bodyPr wrap="none" rtlCol="0">
+            <a:spAutoFit/>
+          </a:bodyPr>
+          <a:lstStyle/>
+          <a:p>
+            <a:pPr algn="ctr"/>
+            <a:r>
+              <a:rPr lang="en-AU" sz="4000" dirty="0" smtClean="0"/>
+              <a:t>decision making</a:t>
+            </a:r>
+            <a:endParaRPr lang="en-AU" sz="4000" dirty="0"/>
+          </a:p>
+        </p:txBody>
+      </p:sp>
+      <p:sp>
+        <p:nvSpPr>
+          <p:cNvPr id="9" name="TextBox 8"/>
+          <p:cNvSpPr txBox="1"/>
+          <p:nvPr/>
+        </p:nvSpPr>
+        <p:spPr>
+          <a:xfrm>
+            <a:off x="1111947" y="4288936"/>
+            <a:ext cx="4733347" cy="523220"/>
+          </a:xfrm>
+          <a:prstGeom prst="rect">
+            <a:avLst/>
+          </a:prstGeom>
+          <a:noFill/>
+        </p:spPr>
+        <p:txBody>
+          <a:bodyPr wrap="none" rtlCol="0">
+            <a:spAutoFit/>
+          </a:bodyPr>
+          <a:lstStyle/>
+          <a:p>
+            <a:pPr algn="ctr"/>
+            <a:r>
+              <a:rPr lang="en-AU" sz="2800" dirty="0" smtClean="0"/>
+              <a:t>errors can be quickly detected</a:t>
+            </a:r>
+            <a:endParaRPr lang="en-AU" sz="2800" dirty="0"/>
+          </a:p>
+        </p:txBody>
+      </p:sp>
+      <p:sp>
+        <p:nvSpPr>
+          <p:cNvPr id="11" name="Rectangle 10"/>
+          <p:cNvSpPr/>
+          <p:nvPr/>
+        </p:nvSpPr>
+        <p:spPr>
+          <a:xfrm>
+            <a:off x="7086017" y="2551981"/>
+            <a:ext cx="1722074" cy="769441"/>
+          </a:xfrm>
+          <a:prstGeom prst="rect">
+            <a:avLst/>
+          </a:prstGeom>
+        </p:spPr>
+        <p:txBody>
+          <a:bodyPr wrap="none">
+            <a:spAutoFit/>
+          </a:bodyPr>
+          <a:lstStyle/>
+          <a:p>
+            <a:pPr algn="ctr"/>
+            <a:r>
+              <a:rPr lang="en-AU" sz="4400" dirty="0" smtClean="0">
+                <a:solidFill>
+                  <a:schemeClr val="accent6">
+                    <a:lumMod val="20000"/>
+                    <a:lumOff val="80000"/>
+                  </a:schemeClr>
+                </a:solidFill>
+                <a:latin typeface="+mj-lt"/>
+              </a:rPr>
+              <a:t>faster </a:t>
+            </a:r>
+            <a:endParaRPr lang="en-AU" sz="4400" dirty="0">
+              <a:solidFill>
+                <a:schemeClr val="accent6">
+                  <a:lumMod val="20000"/>
+                  <a:lumOff val="80000"/>
+                </a:schemeClr>
+              </a:solidFill>
+              <a:latin typeface="+mj-lt"/>
+            </a:endParaRPr>
+          </a:p>
+        </p:txBody>
+      </p:sp>
+      <p:sp>
+        <p:nvSpPr>
+          <p:cNvPr id="12" name="Rectangle 11"/>
+          <p:cNvSpPr/>
+          <p:nvPr/>
+        </p:nvSpPr>
+        <p:spPr>
+          <a:xfrm>
+            <a:off x="8808091" y="2551981"/>
+            <a:ext cx="2145780" cy="769441"/>
+          </a:xfrm>
+          <a:prstGeom prst="rect">
+            <a:avLst/>
+          </a:prstGeom>
+        </p:spPr>
+        <p:txBody>
+          <a:bodyPr wrap="none">
+            <a:spAutoFit/>
+          </a:bodyPr>
+          <a:lstStyle/>
+          <a:p>
+            <a:pPr algn="ctr"/>
+            <a:r>
+              <a:rPr lang="en-AU" sz="4400" dirty="0" smtClean="0">
+                <a:solidFill>
+                  <a:schemeClr val="accent6">
+                    <a:lumMod val="20000"/>
+                    <a:lumOff val="80000"/>
+                  </a:schemeClr>
+                </a:solidFill>
+                <a:latin typeface="+mj-lt"/>
+              </a:rPr>
+              <a:t>cheaper</a:t>
+            </a:r>
+            <a:endParaRPr lang="en-AU" sz="4400" dirty="0">
+              <a:solidFill>
+                <a:schemeClr val="accent6">
+                  <a:lumMod val="20000"/>
+                  <a:lumOff val="80000"/>
+                </a:schemeClr>
+              </a:solidFill>
+              <a:latin typeface="+mj-lt"/>
+            </a:endParaRPr>
+          </a:p>
+        </p:txBody>
+      </p:sp>
+    </p:spTree>
+    <p:extLst>
+      <p:ext uri="{BB962C8B-B14F-4D97-AF65-F5344CB8AC3E}">
+        <p14:creationId xmlns:p14="http://schemas.microsoft.com/office/powerpoint/2010/main" val="1121806212"/>
+      </p:ext>
+    </p:extLst>
+  </p:cSld>
+  <p:clrMapOvr>
+    <a:masterClrMapping/>
+  </p:clrMapOvr>
+  <p:timing>
+    <p:tnLst>
+      <p:par>
+        <p:cTn id="1" dur="indefinite" restart="never" nodeType="tmRoot"/>
+      </p:par>
+    </p:tnLst>
+  </p:timing>
+</p:sld>
+</file>
+
+<file path=ppt/slides/slide11.xml><?xml version="1.0" encoding="utf-8"?>
+<p:sld xmlns:a="http://schemas.openxmlformats.org/drawingml/2006/main" xmlns:r="http://schemas.openxmlformats.org/officeDocument/2006/relationships" xmlns:p="http://schemas.openxmlformats.org/presentationml/2006/main">
+  <p:cSld>
+    <p:spTree>
+      <p:nvGrpSpPr>
+        <p:cNvPr id="1" name=""/>
+        <p:cNvGrpSpPr/>
+        <p:nvPr/>
+      </p:nvGrpSpPr>
+      <p:grpSpPr>
+        <a:xfrm>
+          <a:off x="0" y="0"/>
+          <a:ext cx="0" cy="0"/>
+          <a:chOff x="0" y="0"/>
+          <a:chExt cx="0" cy="0"/>
+        </a:xfrm>
+      </p:grpSpPr>
+      <p:sp>
+        <p:nvSpPr>
+          <p:cNvPr id="3" name="TextBox 2"/>
+          <p:cNvSpPr txBox="1"/>
+          <p:nvPr/>
+        </p:nvSpPr>
+        <p:spPr>
+          <a:xfrm>
             <a:off x="5057639" y="2973038"/>
             <a:ext cx="2310825" cy="830997"/>
           </a:xfrm>
@@ -4355,157 +4646,6 @@
 </p:sld>
 </file>
 
-<file path=ppt/slides/slide11.xml><?xml version="1.0" encoding="utf-8"?>
-<p:sld xmlns:a="http://schemas.openxmlformats.org/drawingml/2006/main" xmlns:r="http://schemas.openxmlformats.org/officeDocument/2006/relationships" xmlns:p="http://schemas.openxmlformats.org/presentationml/2006/main">
-  <p:cSld>
-    <p:spTree>
-      <p:nvGrpSpPr>
-        <p:cNvPr id="1" name=""/>
-        <p:cNvGrpSpPr/>
-        <p:nvPr/>
-      </p:nvGrpSpPr>
-      <p:grpSpPr>
-        <a:xfrm>
-          <a:off x="0" y="0"/>
-          <a:ext cx="0" cy="0"/>
-          <a:chOff x="0" y="0"/>
-          <a:chExt cx="0" cy="0"/>
-        </a:xfrm>
-      </p:grpSpPr>
-      <p:sp>
-        <p:nvSpPr>
-          <p:cNvPr id="3" name="TextBox 2"/>
-          <p:cNvSpPr txBox="1"/>
-          <p:nvPr/>
-        </p:nvSpPr>
-        <p:spPr>
-          <a:xfrm>
-            <a:off x="957147" y="742229"/>
-            <a:ext cx="6862969" cy="769441"/>
-          </a:xfrm>
-          <a:prstGeom prst="rect">
-            <a:avLst/>
-          </a:prstGeom>
-          <a:noFill/>
-        </p:spPr>
-        <p:txBody>
-          <a:bodyPr wrap="none" rtlCol="0">
-            <a:spAutoFit/>
-          </a:bodyPr>
-          <a:lstStyle/>
-          <a:p>
-            <a:r>
-              <a:rPr lang="en-AU" sz="4400" dirty="0" smtClean="0">
-                <a:latin typeface="+mj-lt"/>
-              </a:rPr>
-              <a:t>two fundamental processes</a:t>
-            </a:r>
-            <a:endParaRPr lang="en-AU" sz="4400" dirty="0">
-              <a:latin typeface="+mj-lt"/>
-            </a:endParaRPr>
-          </a:p>
-        </p:txBody>
-      </p:sp>
-      <p:sp>
-        <p:nvSpPr>
-          <p:cNvPr id="9" name="TextBox 8"/>
-          <p:cNvSpPr txBox="1"/>
-          <p:nvPr/>
-        </p:nvSpPr>
-        <p:spPr>
-          <a:xfrm>
-            <a:off x="1885949" y="3735679"/>
-            <a:ext cx="2722220" cy="584775"/>
-          </a:xfrm>
-          <a:prstGeom prst="rect">
-            <a:avLst/>
-          </a:prstGeom>
-          <a:noFill/>
-        </p:spPr>
-        <p:txBody>
-          <a:bodyPr wrap="none" rtlCol="0">
-            <a:spAutoFit/>
-          </a:bodyPr>
-          <a:lstStyle/>
-          <a:p>
-            <a:r>
-              <a:rPr lang="en-AU" sz="3200" smtClean="0"/>
-              <a:t>data collection</a:t>
-            </a:r>
-            <a:endParaRPr lang="en-AU" sz="3200"/>
-          </a:p>
-        </p:txBody>
-      </p:sp>
-      <p:sp>
-        <p:nvSpPr>
-          <p:cNvPr id="10" name="TextBox 9"/>
-          <p:cNvSpPr txBox="1"/>
-          <p:nvPr/>
-        </p:nvSpPr>
-        <p:spPr>
-          <a:xfrm>
-            <a:off x="6789186" y="3349917"/>
-            <a:ext cx="4008534" cy="1569660"/>
-          </a:xfrm>
-          <a:prstGeom prst="rect">
-            <a:avLst/>
-          </a:prstGeom>
-          <a:noFill/>
-        </p:spPr>
-        <p:txBody>
-          <a:bodyPr wrap="none" rtlCol="0">
-            <a:spAutoFit/>
-          </a:bodyPr>
-          <a:lstStyle/>
-          <a:p>
-            <a:pPr algn="ctr"/>
-            <a:r>
-              <a:rPr lang="en-AU" sz="3200" dirty="0"/>
-              <a:t>data analysis</a:t>
-            </a:r>
-            <a:br>
-              <a:rPr lang="en-AU" sz="3200" dirty="0"/>
-            </a:br>
-            <a:r>
-              <a:rPr lang="en-AU" sz="3200" dirty="0" smtClean="0"/>
-              <a:t>automated reporting</a:t>
-            </a:r>
-            <a:endParaRPr lang="en-AU" sz="3200" dirty="0"/>
-          </a:p>
-          <a:p>
-            <a:pPr algn="ctr"/>
-            <a:r>
-              <a:rPr lang="en-AU" sz="3200" dirty="0"/>
-              <a:t>interactive </a:t>
-            </a:r>
-            <a:r>
-              <a:rPr lang="en-AU" sz="3200" dirty="0" smtClean="0"/>
-              <a:t>exploration</a:t>
-            </a:r>
-            <a:endParaRPr lang="en-AU" sz="3200" dirty="0"/>
-          </a:p>
-        </p:txBody>
-      </p:sp>
-    </p:spTree>
-    <p:extLst>
-      <p:ext uri="{BB962C8B-B14F-4D97-AF65-F5344CB8AC3E}">
-        <p14:creationId xmlns:p14="http://schemas.microsoft.com/office/powerpoint/2010/main" val="943449888"/>
-      </p:ext>
-    </p:extLst>
-  </p:cSld>
-  <p:clrMapOvr>
-    <a:masterClrMapping/>
-  </p:clrMapOvr>
-  <p:timing>
-    <p:tnLst>
-      <p:par>
-        <p:cTn id="1" dur="indefinite" restart="never" nodeType="tmRoot"/>
-      </p:par>
-    </p:tnLst>
-  </p:timing>
-</p:sld>
-</file>
-
 <file path=ppt/slides/slide12.xml><?xml version="1.0" encoding="utf-8"?>
 <p:sld xmlns:a="http://schemas.openxmlformats.org/drawingml/2006/main" xmlns:r="http://schemas.openxmlformats.org/officeDocument/2006/relationships" xmlns:p="http://schemas.openxmlformats.org/presentationml/2006/main">
   <p:cSld>
@@ -4525,14 +4665,14 @@
       </p:grpSpPr>
       <p:sp>
         <p:nvSpPr>
-          <p:cNvPr id="2" name="TextBox 1"/>
+          <p:cNvPr id="3" name="TextBox 2"/>
           <p:cNvSpPr txBox="1"/>
           <p:nvPr/>
         </p:nvSpPr>
         <p:spPr>
           <a:xfrm>
             <a:off x="957147" y="742229"/>
-            <a:ext cx="3740127" cy="769441"/>
+            <a:ext cx="6862969" cy="769441"/>
           </a:xfrm>
           <a:prstGeom prst="rect">
             <a:avLst/>
@@ -4545,12 +4685,11 @@
           </a:bodyPr>
           <a:lstStyle/>
           <a:p>
-            <a:pPr algn="ctr"/>
-            <a:r>
-              <a:rPr lang="en-AU" sz="4400" smtClean="0">
+            <a:r>
+              <a:rPr lang="en-AU" sz="4400" dirty="0" smtClean="0">
                 <a:latin typeface="+mj-lt"/>
               </a:rPr>
-              <a:t>data collection</a:t>
+              <a:t>two fundamental processes</a:t>
             </a:r>
             <a:endParaRPr lang="en-AU" sz="4400" dirty="0">
               <a:latin typeface="+mj-lt"/>
@@ -4560,14 +4699,14 @@
       </p:sp>
       <p:sp>
         <p:nvSpPr>
-          <p:cNvPr id="3" name="TextBox 2"/>
+          <p:cNvPr id="9" name="TextBox 8"/>
           <p:cNvSpPr txBox="1"/>
           <p:nvPr/>
         </p:nvSpPr>
         <p:spPr>
           <a:xfrm>
-            <a:off x="4081092" y="2798970"/>
-            <a:ext cx="3994171" cy="523220"/>
+            <a:off x="1885949" y="3735679"/>
+            <a:ext cx="2722220" cy="584775"/>
           </a:xfrm>
           <a:prstGeom prst="rect">
             <a:avLst/>
@@ -4580,28 +4719,24 @@
           </a:bodyPr>
           <a:lstStyle/>
           <a:p>
-            <a:pPr algn="ctr"/>
-            <a:r>
-              <a:rPr lang="en-AU" sz="2800" dirty="0" smtClean="0"/>
-              <a:t>electronic form </a:t>
-            </a:r>
-            <a:r>
-              <a:rPr lang="en-AU" sz="2800" strike="sngStrike" dirty="0" smtClean="0"/>
-              <a:t>not paper</a:t>
-            </a:r>
-          </a:p>
-        </p:txBody>
-      </p:sp>
-      <p:sp>
-        <p:nvSpPr>
-          <p:cNvPr id="4" name="TextBox 3"/>
+            <a:r>
+              <a:rPr lang="en-AU" sz="3200" smtClean="0"/>
+              <a:t>data collection</a:t>
+            </a:r>
+            <a:endParaRPr lang="en-AU" sz="3200"/>
+          </a:p>
+        </p:txBody>
+      </p:sp>
+      <p:sp>
+        <p:nvSpPr>
+          <p:cNvPr id="10" name="TextBox 9"/>
           <p:cNvSpPr txBox="1"/>
           <p:nvPr/>
         </p:nvSpPr>
         <p:spPr>
           <a:xfrm>
-            <a:off x="3152118" y="3462789"/>
-            <a:ext cx="5852116" cy="523220"/>
+            <a:off x="6789186" y="3349917"/>
+            <a:ext cx="4008534" cy="1569660"/>
           </a:xfrm>
           <a:prstGeom prst="rect">
             <a:avLst/>
@@ -4616,85 +4751,36 @@
           <a:p>
             <a:pPr algn="ctr"/>
             <a:r>
-              <a:rPr lang="en-AU" sz="2800" dirty="0" smtClean="0"/>
-              <a:t>can work </a:t>
-            </a:r>
-            <a:r>
-              <a:rPr lang="en-AU" sz="2800" dirty="0" smtClean="0">
-                <a:solidFill>
-                  <a:schemeClr val="accent3">
-                    <a:lumMod val="20000"/>
-                    <a:lumOff val="80000"/>
-                  </a:schemeClr>
-                </a:solidFill>
-                <a:latin typeface="+mj-lt"/>
-              </a:rPr>
-              <a:t>offline</a:t>
-            </a:r>
-            <a:r>
-              <a:rPr lang="en-AU" sz="2800" dirty="0" smtClean="0">
-                <a:solidFill>
-                  <a:schemeClr val="accent3">
-                    <a:lumMod val="20000"/>
-                    <a:lumOff val="80000"/>
-                  </a:schemeClr>
-                </a:solidFill>
-              </a:rPr>
-              <a:t> </a:t>
-            </a:r>
-            <a:r>
-              <a:rPr lang="en-AU" sz="2800" dirty="0" smtClean="0"/>
-              <a:t>on almost any device</a:t>
-            </a:r>
-          </a:p>
-        </p:txBody>
-      </p:sp>
-      <p:sp>
-        <p:nvSpPr>
-          <p:cNvPr id="5" name="TextBox 4"/>
-          <p:cNvSpPr txBox="1"/>
-          <p:nvPr/>
-        </p:nvSpPr>
-        <p:spPr>
-          <a:xfrm>
-            <a:off x="3301102" y="4126607"/>
-            <a:ext cx="5554149" cy="523220"/>
-          </a:xfrm>
-          <a:prstGeom prst="rect">
-            <a:avLst/>
-          </a:prstGeom>
-          <a:noFill/>
-        </p:spPr>
-        <p:txBody>
-          <a:bodyPr wrap="none" rtlCol="0">
-            <a:spAutoFit/>
-          </a:bodyPr>
-          <a:lstStyle/>
+              <a:rPr lang="en-AU" sz="3200" dirty="0"/>
+              <a:t>data analysis</a:t>
+            </a:r>
+            <a:br>
+              <a:rPr lang="en-AU" sz="3200" dirty="0"/>
+            </a:br>
+            <a:r>
+              <a:rPr lang="en-AU" sz="3200" dirty="0" smtClean="0"/>
+              <a:t>automated reporting</a:t>
+            </a:r>
+            <a:endParaRPr lang="en-AU" sz="3200" dirty="0"/>
+          </a:p>
           <a:p>
             <a:pPr algn="ctr"/>
             <a:r>
-              <a:rPr lang="en-AU" sz="2800" dirty="0" smtClean="0"/>
-              <a:t>data stored in-house or in the </a:t>
-            </a:r>
-            <a:r>
-              <a:rPr lang="en-AU" sz="2800" dirty="0" smtClean="0">
-                <a:solidFill>
-                  <a:schemeClr val="accent3">
-                    <a:lumMod val="20000"/>
-                    <a:lumOff val="80000"/>
-                  </a:schemeClr>
-                </a:solidFill>
-                <a:latin typeface="+mj-lt"/>
-              </a:rPr>
-              <a:t>cloud</a:t>
-            </a:r>
+              <a:rPr lang="en-AU" sz="3200" dirty="0"/>
+              <a:t>interactive </a:t>
+            </a:r>
+            <a:r>
+              <a:rPr lang="en-AU" sz="3200" dirty="0" smtClean="0"/>
+              <a:t>exploration</a:t>
+            </a:r>
+            <a:endParaRPr lang="en-AU" sz="3200" dirty="0"/>
           </a:p>
         </p:txBody>
       </p:sp>
     </p:spTree>
     <p:extLst>
       <p:ext uri="{BB962C8B-B14F-4D97-AF65-F5344CB8AC3E}">
-        <p14:creationId xmlns:p14="http://schemas.microsoft.com/office/powerpoint/2010/main" val="2114663685"/>
+        <p14:creationId xmlns:p14="http://schemas.microsoft.com/office/powerpoint/2010/main" val="943449888"/>
       </p:ext>
     </p:extLst>
   </p:cSld>
@@ -4737,7 +4823,7 @@
         <p:spPr>
           <a:xfrm>
             <a:off x="957147" y="742229"/>
-            <a:ext cx="5042855" cy="769441"/>
+            <a:ext cx="3740127" cy="769441"/>
           </a:xfrm>
           <a:prstGeom prst="rect">
             <a:avLst/>
@@ -4750,11 +4836,12 @@
           </a:bodyPr>
           <a:lstStyle/>
           <a:p>
-            <a:r>
-              <a:rPr lang="en-AU" sz="4400" dirty="0" smtClean="0">
+            <a:pPr algn="ctr"/>
+            <a:r>
+              <a:rPr lang="en-AU" sz="4400" smtClean="0">
                 <a:latin typeface="+mj-lt"/>
               </a:rPr>
-              <a:t>data collection tools</a:t>
+              <a:t>data collection</a:t>
             </a:r>
             <a:endParaRPr lang="en-AU" sz="4400" dirty="0">
               <a:latin typeface="+mj-lt"/>
@@ -4762,75 +4849,16 @@
           </a:p>
         </p:txBody>
       </p:sp>
-      <p:pic>
-        <p:nvPicPr>
-          <p:cNvPr id="5" name="Picture 4"/>
-          <p:cNvPicPr>
-            <a:picLocks noChangeAspect="1"/>
-          </p:cNvPicPr>
-          <p:nvPr/>
-        </p:nvPicPr>
-        <p:blipFill rotWithShape="1">
-          <a:blip r:embed="rId2" cstate="screen">
-            <a:extLst>
-              <a:ext uri="{28A0092B-C50C-407E-A947-70E740481C1C}">
-                <a14:useLocalDpi xmlns:a14="http://schemas.microsoft.com/office/drawing/2010/main"/>
-              </a:ext>
-            </a:extLst>
-          </a:blip>
-          <a:srcRect/>
-          <a:stretch/>
-        </p:blipFill>
-        <p:spPr>
-          <a:xfrm>
-            <a:off x="5518888" y="2469977"/>
-            <a:ext cx="946138" cy="1113597"/>
-          </a:xfrm>
-          <a:prstGeom prst="rect">
-            <a:avLst/>
-          </a:prstGeom>
-        </p:spPr>
-      </p:pic>
-      <p:pic>
-        <p:nvPicPr>
-          <p:cNvPr id="7" name="Picture 6"/>
-          <p:cNvPicPr>
-            <a:picLocks noChangeAspect="1"/>
-          </p:cNvPicPr>
-          <p:nvPr/>
-        </p:nvPicPr>
-        <p:blipFill>
-          <a:blip r:embed="rId3" cstate="screen">
-            <a:extLst>
-              <a:ext uri="{28A0092B-C50C-407E-A947-70E740481C1C}">
-                <a14:useLocalDpi xmlns:a14="http://schemas.microsoft.com/office/drawing/2010/main"/>
-              </a:ext>
-            </a:extLst>
-          </a:blip>
-          <a:stretch>
-            <a:fillRect/>
-          </a:stretch>
-        </p:blipFill>
-        <p:spPr>
-          <a:xfrm>
-            <a:off x="4175510" y="5438320"/>
-            <a:ext cx="644845" cy="644845"/>
-          </a:xfrm>
-          <a:prstGeom prst="rect">
-            <a:avLst/>
-          </a:prstGeom>
-        </p:spPr>
-      </p:pic>
-      <p:sp>
-        <p:nvSpPr>
-          <p:cNvPr id="10" name="TextBox 9"/>
+      <p:sp>
+        <p:nvSpPr>
+          <p:cNvPr id="3" name="TextBox 2"/>
           <p:cNvSpPr txBox="1"/>
           <p:nvPr/>
         </p:nvSpPr>
         <p:spPr>
           <a:xfrm>
-            <a:off x="4969219" y="5529911"/>
-            <a:ext cx="2782493" cy="461665"/>
+            <a:off x="4081092" y="2798970"/>
+            <a:ext cx="3994171" cy="523220"/>
           </a:xfrm>
           <a:prstGeom prst="rect">
             <a:avLst/>
@@ -4843,24 +4871,28 @@
           </a:bodyPr>
           <a:lstStyle/>
           <a:p>
-            <a:r>
-              <a:rPr lang="en-AU" sz="2400" dirty="0" smtClean="0"/>
-              <a:t>Survey 123 for ESRI</a:t>
-            </a:r>
-            <a:endParaRPr lang="en-AU" sz="2400" dirty="0"/>
-          </a:p>
-        </p:txBody>
-      </p:sp>
-      <p:sp>
-        <p:nvSpPr>
-          <p:cNvPr id="11" name="TextBox 10"/>
+            <a:pPr algn="ctr"/>
+            <a:r>
+              <a:rPr lang="en-AU" sz="2800" dirty="0" smtClean="0"/>
+              <a:t>electronic form </a:t>
+            </a:r>
+            <a:r>
+              <a:rPr lang="en-AU" sz="2800" strike="sngStrike" dirty="0" smtClean="0"/>
+              <a:t>not paper</a:t>
+            </a:r>
+          </a:p>
+        </p:txBody>
+      </p:sp>
+      <p:sp>
+        <p:nvSpPr>
+          <p:cNvPr id="4" name="TextBox 3"/>
           <p:cNvSpPr txBox="1"/>
           <p:nvPr/>
         </p:nvSpPr>
         <p:spPr>
           <a:xfrm>
-            <a:off x="4649890" y="3760577"/>
-            <a:ext cx="2684133" cy="615553"/>
+            <a:off x="3152118" y="3462789"/>
+            <a:ext cx="5852116" cy="523220"/>
           </a:xfrm>
           <a:prstGeom prst="rect">
             <a:avLst/>
@@ -4873,8 +4905,13 @@
           </a:bodyPr>
           <a:lstStyle/>
           <a:p>
-            <a:r>
-              <a:rPr lang="en-AU" sz="3400" dirty="0" err="1" smtClean="0">
+            <a:pPr algn="ctr"/>
+            <a:r>
+              <a:rPr lang="en-AU" sz="2800" dirty="0" smtClean="0"/>
+              <a:t>can work </a:t>
+            </a:r>
+            <a:r>
+              <a:rPr lang="en-AU" sz="2800" dirty="0" smtClean="0">
                 <a:solidFill>
                   <a:schemeClr val="accent3">
                     <a:lumMod val="20000"/>
@@ -4883,10 +4920,55 @@
                 </a:solidFill>
                 <a:latin typeface="+mj-lt"/>
               </a:rPr>
-              <a:t>KoBo</a:t>
-            </a:r>
-            <a:r>
-              <a:rPr lang="en-AU" sz="3400" dirty="0" smtClean="0">
+              <a:t>offline</a:t>
+            </a:r>
+            <a:r>
+              <a:rPr lang="en-AU" sz="2800" dirty="0" smtClean="0">
+                <a:solidFill>
+                  <a:schemeClr val="accent3">
+                    <a:lumMod val="20000"/>
+                    <a:lumOff val="80000"/>
+                  </a:schemeClr>
+                </a:solidFill>
+              </a:rPr>
+              <a:t> </a:t>
+            </a:r>
+            <a:r>
+              <a:rPr lang="en-AU" sz="2800" dirty="0" smtClean="0"/>
+              <a:t>on almost any device</a:t>
+            </a:r>
+          </a:p>
+        </p:txBody>
+      </p:sp>
+      <p:sp>
+        <p:nvSpPr>
+          <p:cNvPr id="5" name="TextBox 4"/>
+          <p:cNvSpPr txBox="1"/>
+          <p:nvPr/>
+        </p:nvSpPr>
+        <p:spPr>
+          <a:xfrm>
+            <a:off x="3301102" y="4126607"/>
+            <a:ext cx="5554149" cy="523220"/>
+          </a:xfrm>
+          <a:prstGeom prst="rect">
+            <a:avLst/>
+          </a:prstGeom>
+          <a:noFill/>
+        </p:spPr>
+        <p:txBody>
+          <a:bodyPr wrap="none" rtlCol="0">
+            <a:spAutoFit/>
+          </a:bodyPr>
+          <a:lstStyle/>
+          <a:p>
+            <a:pPr algn="ctr"/>
+            <a:r>
+              <a:rPr lang="en-AU" sz="2800" dirty="0" smtClean="0"/>
+              <a:t>data stored in-house or in the </a:t>
+            </a:r>
+            <a:r>
+              <a:rPr lang="en-AU" sz="2800" dirty="0" smtClean="0">
                 <a:solidFill>
                   <a:schemeClr val="accent3">
                     <a:lumMod val="20000"/>
@@ -4895,182 +4977,15 @@
                 </a:solidFill>
                 <a:latin typeface="+mj-lt"/>
               </a:rPr>
-              <a:t> Toolbox</a:t>
-            </a:r>
-          </a:p>
-        </p:txBody>
-      </p:sp>
-      <p:pic>
-        <p:nvPicPr>
-          <p:cNvPr id="12" name="Picture 11"/>
-          <p:cNvPicPr>
-            <a:picLocks noChangeAspect="1"/>
-          </p:cNvPicPr>
-          <p:nvPr/>
-        </p:nvPicPr>
-        <p:blipFill>
-          <a:blip r:embed="rId4" cstate="screen">
-            <a:extLst>
-              <a:ext uri="{28A0092B-C50C-407E-A947-70E740481C1C}">
-                <a14:useLocalDpi xmlns:a14="http://schemas.microsoft.com/office/drawing/2010/main"/>
-              </a:ext>
-            </a:extLst>
-          </a:blip>
-          <a:stretch>
-            <a:fillRect/>
-          </a:stretch>
-        </p:blipFill>
-        <p:spPr>
-          <a:xfrm>
-            <a:off x="8301134" y="2147612"/>
-            <a:ext cx="1972240" cy="1972240"/>
-          </a:xfrm>
-          <a:prstGeom prst="rect">
-            <a:avLst/>
-          </a:prstGeom>
-        </p:spPr>
-      </p:pic>
-      <p:sp>
-        <p:nvSpPr>
-          <p:cNvPr id="13" name="TextBox 12"/>
-          <p:cNvSpPr txBox="1"/>
-          <p:nvPr/>
-        </p:nvSpPr>
-        <p:spPr>
-          <a:xfrm>
-            <a:off x="8135336" y="3785342"/>
-            <a:ext cx="2610010" cy="584775"/>
-          </a:xfrm>
-          <a:prstGeom prst="rect">
-            <a:avLst/>
-          </a:prstGeom>
-          <a:noFill/>
-        </p:spPr>
-        <p:txBody>
-          <a:bodyPr wrap="none" rtlCol="0">
-            <a:spAutoFit/>
-          </a:bodyPr>
-          <a:lstStyle/>
-          <a:p>
-            <a:r>
-              <a:rPr lang="en-AU" sz="3200" smtClean="0"/>
-              <a:t>Open Data Kit</a:t>
-            </a:r>
-            <a:endParaRPr lang="en-AU" sz="3200" dirty="0"/>
-          </a:p>
-        </p:txBody>
-      </p:sp>
-      <p:pic>
-        <p:nvPicPr>
-          <p:cNvPr id="14" name="Picture 13"/>
-          <p:cNvPicPr>
-            <a:picLocks noChangeAspect="1"/>
-          </p:cNvPicPr>
-          <p:nvPr/>
-        </p:nvPicPr>
-        <p:blipFill>
-          <a:blip r:embed="rId5" cstate="screen">
-            <a:extLst>
-              <a:ext uri="{28A0092B-C50C-407E-A947-70E740481C1C}">
-                <a14:useLocalDpi xmlns:a14="http://schemas.microsoft.com/office/drawing/2010/main"/>
-              </a:ext>
-            </a:extLst>
-          </a:blip>
-          <a:stretch>
-            <a:fillRect/>
-          </a:stretch>
-        </p:blipFill>
-        <p:spPr>
-          <a:xfrm>
-            <a:off x="1913239" y="2694477"/>
-            <a:ext cx="1935338" cy="591846"/>
-          </a:xfrm>
-          <a:prstGeom prst="rect">
-            <a:avLst/>
-          </a:prstGeom>
-        </p:spPr>
-      </p:pic>
-      <p:sp>
-        <p:nvSpPr>
-          <p:cNvPr id="15" name="TextBox 14"/>
-          <p:cNvSpPr txBox="1"/>
-          <p:nvPr/>
-        </p:nvSpPr>
-        <p:spPr>
-          <a:xfrm>
-            <a:off x="2430416" y="3723787"/>
-            <a:ext cx="883575" cy="584775"/>
-          </a:xfrm>
-          <a:prstGeom prst="rect">
-            <a:avLst/>
-          </a:prstGeom>
-          <a:noFill/>
-        </p:spPr>
-        <p:txBody>
-          <a:bodyPr wrap="none" rtlCol="0">
-            <a:spAutoFit/>
-          </a:bodyPr>
-          <a:lstStyle/>
-          <a:p>
-            <a:r>
-              <a:rPr lang="en-AU" sz="3200" dirty="0" smtClean="0"/>
-              <a:t>Ona</a:t>
-            </a:r>
-          </a:p>
-        </p:txBody>
-      </p:sp>
-      <p:sp>
-        <p:nvSpPr>
-          <p:cNvPr id="21" name="Rectangle 20"/>
-          <p:cNvSpPr/>
-          <p:nvPr/>
-        </p:nvSpPr>
-        <p:spPr>
-          <a:xfrm>
-            <a:off x="3519689" y="5031889"/>
-            <a:ext cx="4944533" cy="1286934"/>
-          </a:xfrm>
-          <a:prstGeom prst="rect">
-            <a:avLst/>
-          </a:prstGeom>
-          <a:solidFill>
-            <a:srgbClr val="000000">
-              <a:alpha val="23137"/>
-            </a:srgbClr>
-          </a:solidFill>
-          <a:ln>
-            <a:noFill/>
-          </a:ln>
-        </p:spPr>
-        <p:style>
-          <a:lnRef idx="2">
-            <a:schemeClr val="accent1">
-              <a:shade val="50000"/>
-            </a:schemeClr>
-          </a:lnRef>
-          <a:fillRef idx="1">
-            <a:schemeClr val="accent1"/>
-          </a:fillRef>
-          <a:effectRef idx="0">
-            <a:schemeClr val="accent1"/>
-          </a:effectRef>
-          <a:fontRef idx="minor">
-            <a:schemeClr val="lt1"/>
-          </a:fontRef>
-        </p:style>
-        <p:txBody>
-          <a:bodyPr rtlCol="0" anchor="ctr"/>
-          <a:lstStyle/>
-          <a:p>
-            <a:pPr algn="ctr"/>
-            <a:endParaRPr lang="en-AU"/>
+              <a:t>cloud</a:t>
+            </a:r>
           </a:p>
         </p:txBody>
       </p:sp>
     </p:spTree>
     <p:extLst>
       <p:ext uri="{BB962C8B-B14F-4D97-AF65-F5344CB8AC3E}">
-        <p14:creationId xmlns:p14="http://schemas.microsoft.com/office/powerpoint/2010/main" val="77032568"/>
+        <p14:creationId xmlns:p14="http://schemas.microsoft.com/office/powerpoint/2010/main" val="2114663685"/>
       </p:ext>
     </p:extLst>
   </p:cSld>
@@ -5104,15 +5019,49 @@
           <a:chExt cx="0" cy="0"/>
         </a:xfrm>
       </p:grpSpPr>
+      <p:sp>
+        <p:nvSpPr>
+          <p:cNvPr id="2" name="TextBox 1"/>
+          <p:cNvSpPr txBox="1"/>
+          <p:nvPr/>
+        </p:nvSpPr>
+        <p:spPr>
+          <a:xfrm>
+            <a:off x="957147" y="742229"/>
+            <a:ext cx="5042855" cy="769441"/>
+          </a:xfrm>
+          <a:prstGeom prst="rect">
+            <a:avLst/>
+          </a:prstGeom>
+          <a:noFill/>
+        </p:spPr>
+        <p:txBody>
+          <a:bodyPr wrap="none" rtlCol="0">
+            <a:spAutoFit/>
+          </a:bodyPr>
+          <a:lstStyle/>
+          <a:p>
+            <a:r>
+              <a:rPr lang="en-AU" sz="4400" dirty="0" smtClean="0">
+                <a:latin typeface="+mj-lt"/>
+              </a:rPr>
+              <a:t>data collection tools</a:t>
+            </a:r>
+            <a:endParaRPr lang="en-AU" sz="4400" dirty="0">
+              <a:latin typeface="+mj-lt"/>
+            </a:endParaRPr>
+          </a:p>
+        </p:txBody>
+      </p:sp>
       <p:pic>
         <p:nvPicPr>
-          <p:cNvPr id="2" name="Picture 1"/>
+          <p:cNvPr id="5" name="Picture 4"/>
           <p:cNvPicPr>
             <a:picLocks noChangeAspect="1"/>
           </p:cNvPicPr>
           <p:nvPr/>
         </p:nvPicPr>
-        <p:blipFill>
+        <p:blipFill rotWithShape="1">
           <a:blip r:embed="rId2" cstate="screen">
             <a:extLst>
               <a:ext uri="{28A0092B-C50C-407E-A947-70E740481C1C}">
@@ -5120,57 +5069,22 @@
               </a:ext>
             </a:extLst>
           </a:blip>
-          <a:stretch>
-            <a:fillRect/>
-          </a:stretch>
+          <a:srcRect/>
+          <a:stretch/>
         </p:blipFill>
         <p:spPr>
           <a:xfrm>
-            <a:off x="9885467" y="4089348"/>
-            <a:ext cx="661260" cy="649214"/>
+            <a:off x="5518888" y="2469977"/>
+            <a:ext cx="946138" cy="1113597"/>
           </a:xfrm>
           <a:prstGeom prst="rect">
             <a:avLst/>
           </a:prstGeom>
         </p:spPr>
       </p:pic>
-      <p:sp>
-        <p:nvSpPr>
-          <p:cNvPr id="4" name="TextBox 3"/>
-          <p:cNvSpPr txBox="1"/>
-          <p:nvPr/>
-        </p:nvSpPr>
-        <p:spPr>
-          <a:xfrm>
-            <a:off x="957147" y="742229"/>
-            <a:ext cx="8965660" cy="769441"/>
-          </a:xfrm>
-          <a:prstGeom prst="rect">
-            <a:avLst/>
-          </a:prstGeom>
-          <a:noFill/>
-        </p:spPr>
-        <p:txBody>
-          <a:bodyPr wrap="none" rtlCol="0">
-            <a:spAutoFit/>
-          </a:bodyPr>
-          <a:lstStyle/>
-          <a:p>
-            <a:r>
-              <a:rPr lang="en-AU" sz="4400" dirty="0" smtClean="0">
-                <a:latin typeface="+mj-lt"/>
-              </a:rPr>
-              <a:t>sometimes paperless is not possible</a:t>
-            </a:r>
-            <a:endParaRPr lang="en-AU" sz="4400" dirty="0">
-              <a:latin typeface="+mj-lt"/>
-            </a:endParaRPr>
-          </a:p>
-        </p:txBody>
-      </p:sp>
       <p:pic>
         <p:nvPicPr>
-          <p:cNvPr id="5" name="Picture 4"/>
+          <p:cNvPr id="7" name="Picture 6"/>
           <p:cNvPicPr>
             <a:picLocks noChangeAspect="1"/>
           </p:cNvPicPr>
@@ -5190,17 +5104,96 @@
         </p:blipFill>
         <p:spPr>
           <a:xfrm>
-            <a:off x="7303500" y="4089348"/>
-            <a:ext cx="1247518" cy="645201"/>
+            <a:off x="4175510" y="5438320"/>
+            <a:ext cx="644845" cy="644845"/>
           </a:xfrm>
           <a:prstGeom prst="rect">
             <a:avLst/>
           </a:prstGeom>
         </p:spPr>
       </p:pic>
+      <p:sp>
+        <p:nvSpPr>
+          <p:cNvPr id="10" name="TextBox 9"/>
+          <p:cNvSpPr txBox="1"/>
+          <p:nvPr/>
+        </p:nvSpPr>
+        <p:spPr>
+          <a:xfrm>
+            <a:off x="4969219" y="5529911"/>
+            <a:ext cx="2782493" cy="461665"/>
+          </a:xfrm>
+          <a:prstGeom prst="rect">
+            <a:avLst/>
+          </a:prstGeom>
+          <a:noFill/>
+        </p:spPr>
+        <p:txBody>
+          <a:bodyPr wrap="none" rtlCol="0">
+            <a:spAutoFit/>
+          </a:bodyPr>
+          <a:lstStyle/>
+          <a:p>
+            <a:r>
+              <a:rPr lang="en-AU" sz="2400" dirty="0" smtClean="0"/>
+              <a:t>Survey 123 for ESRI</a:t>
+            </a:r>
+            <a:endParaRPr lang="en-AU" sz="2400" dirty="0"/>
+          </a:p>
+        </p:txBody>
+      </p:sp>
+      <p:sp>
+        <p:nvSpPr>
+          <p:cNvPr id="11" name="TextBox 10"/>
+          <p:cNvSpPr txBox="1"/>
+          <p:nvPr/>
+        </p:nvSpPr>
+        <p:spPr>
+          <a:xfrm>
+            <a:off x="4649890" y="3760577"/>
+            <a:ext cx="2684133" cy="615553"/>
+          </a:xfrm>
+          <a:prstGeom prst="rect">
+            <a:avLst/>
+          </a:prstGeom>
+          <a:noFill/>
+        </p:spPr>
+        <p:txBody>
+          <a:bodyPr wrap="none" rtlCol="0">
+            <a:spAutoFit/>
+          </a:bodyPr>
+          <a:lstStyle/>
+          <a:p>
+            <a:r>
+              <a:rPr lang="en-AU" sz="3400" dirty="0" err="1" smtClean="0">
+                <a:solidFill>
+                  <a:schemeClr val="accent3">
+                    <a:lumMod val="20000"/>
+                    <a:lumOff val="80000"/>
+                  </a:schemeClr>
+                </a:solidFill>
+                <a:latin typeface="+mj-lt"/>
+              </a:rPr>
+              <a:t>KoBo</a:t>
+            </a:r>
+            <a:r>
+              <a:rPr lang="en-AU" sz="3400" dirty="0" smtClean="0">
+                <a:solidFill>
+                  <a:schemeClr val="accent3">
+                    <a:lumMod val="20000"/>
+                    <a:lumOff val="80000"/>
+                  </a:schemeClr>
+                </a:solidFill>
+                <a:latin typeface="+mj-lt"/>
+              </a:rPr>
+              <a:t> Toolbox</a:t>
+            </a:r>
+          </a:p>
+        </p:txBody>
+      </p:sp>
       <p:pic>
         <p:nvPicPr>
-          <p:cNvPr id="6" name="Picture 5"/>
+          <p:cNvPr id="12" name="Picture 11"/>
           <p:cNvPicPr>
             <a:picLocks noChangeAspect="1"/>
           </p:cNvPicPr>
@@ -5220,8 +5213,8 @@
         </p:blipFill>
         <p:spPr>
           <a:xfrm>
-            <a:off x="8844543" y="4089348"/>
-            <a:ext cx="703515" cy="725793"/>
+            <a:off x="8301134" y="2147612"/>
+            <a:ext cx="1972240" cy="1972240"/>
           </a:xfrm>
           <a:prstGeom prst="rect">
             <a:avLst/>
@@ -5230,14 +5223,14 @@
       </p:pic>
       <p:sp>
         <p:nvSpPr>
-          <p:cNvPr id="7" name="TextBox 6"/>
+          <p:cNvPr id="13" name="TextBox 12"/>
           <p:cNvSpPr txBox="1"/>
           <p:nvPr/>
         </p:nvSpPr>
         <p:spPr>
           <a:xfrm>
-            <a:off x="7506702" y="2733620"/>
-            <a:ext cx="3082087" cy="1077218"/>
+            <a:off x="8135336" y="3785342"/>
+            <a:ext cx="2610010" cy="584775"/>
           </a:xfrm>
           <a:prstGeom prst="rect">
             <a:avLst/>
@@ -5245,43 +5238,59 @@
           <a:noFill/>
         </p:spPr>
         <p:txBody>
-          <a:bodyPr wrap="square" rtlCol="0">
+          <a:bodyPr wrap="none" rtlCol="0">
             <a:spAutoFit/>
           </a:bodyPr>
           <a:lstStyle/>
           <a:p>
             <a:r>
-              <a:rPr lang="en-AU" sz="3200" dirty="0" smtClean="0">
-                <a:solidFill>
-                  <a:schemeClr val="accent3">
-                    <a:lumMod val="20000"/>
-                    <a:lumOff val="80000"/>
-                  </a:schemeClr>
-                </a:solidFill>
-              </a:rPr>
-              <a:t>store your data in a database</a:t>
-            </a:r>
-            <a:endParaRPr lang="en-AU" sz="3200" dirty="0">
-              <a:solidFill>
-                <a:schemeClr val="accent3">
-                  <a:lumMod val="20000"/>
-                  <a:lumOff val="80000"/>
-                </a:schemeClr>
-              </a:solidFill>
-            </a:endParaRPr>
-          </a:p>
-        </p:txBody>
-      </p:sp>
-      <p:sp>
-        <p:nvSpPr>
-          <p:cNvPr id="8" name="TextBox 7"/>
+              <a:rPr lang="en-AU" sz="3200" smtClean="0"/>
+              <a:t>Open Data Kit</a:t>
+            </a:r>
+            <a:endParaRPr lang="en-AU" sz="3200" dirty="0"/>
+          </a:p>
+        </p:txBody>
+      </p:sp>
+      <p:pic>
+        <p:nvPicPr>
+          <p:cNvPr id="14" name="Picture 13"/>
+          <p:cNvPicPr>
+            <a:picLocks noChangeAspect="1"/>
+          </p:cNvPicPr>
+          <p:nvPr/>
+        </p:nvPicPr>
+        <p:blipFill>
+          <a:blip r:embed="rId5" cstate="screen">
+            <a:extLst>
+              <a:ext uri="{28A0092B-C50C-407E-A947-70E740481C1C}">
+                <a14:useLocalDpi xmlns:a14="http://schemas.microsoft.com/office/drawing/2010/main"/>
+              </a:ext>
+            </a:extLst>
+          </a:blip>
+          <a:stretch>
+            <a:fillRect/>
+          </a:stretch>
+        </p:blipFill>
+        <p:spPr>
+          <a:xfrm>
+            <a:off x="1913239" y="2694477"/>
+            <a:ext cx="1935338" cy="591846"/>
+          </a:xfrm>
+          <a:prstGeom prst="rect">
+            <a:avLst/>
+          </a:prstGeom>
+        </p:spPr>
+      </p:pic>
+      <p:sp>
+        <p:nvSpPr>
+          <p:cNvPr id="15" name="TextBox 14"/>
           <p:cNvSpPr txBox="1"/>
           <p:nvPr/>
         </p:nvSpPr>
         <p:spPr>
           <a:xfrm>
-            <a:off x="1353369" y="2577989"/>
-            <a:ext cx="3444817" cy="1569660"/>
+            <a:off x="2430416" y="3723787"/>
+            <a:ext cx="883575" cy="584775"/>
           </a:xfrm>
           <a:prstGeom prst="rect">
             <a:avLst/>
@@ -5289,67 +5298,70 @@
           <a:noFill/>
         </p:spPr>
         <p:txBody>
-          <a:bodyPr wrap="square" rtlCol="0">
+          <a:bodyPr wrap="none" rtlCol="0">
             <a:spAutoFit/>
           </a:bodyPr>
           <a:lstStyle/>
           <a:p>
             <a:r>
               <a:rPr lang="en-AU" sz="3200" dirty="0" smtClean="0"/>
-              <a:t>you can still use one of the form tools to enter data</a:t>
-            </a:r>
-            <a:endParaRPr lang="en-AU" sz="3200" dirty="0">
-              <a:solidFill>
-                <a:schemeClr val="accent3">
-                  <a:lumMod val="20000"/>
-                  <a:lumOff val="80000"/>
-                </a:schemeClr>
-              </a:solidFill>
-            </a:endParaRPr>
-          </a:p>
-        </p:txBody>
-      </p:sp>
-      <p:sp>
-        <p:nvSpPr>
-          <p:cNvPr id="9" name="TextBox 8"/>
-          <p:cNvSpPr txBox="1"/>
-          <p:nvPr/>
-        </p:nvSpPr>
-        <p:spPr>
-          <a:xfrm>
-            <a:off x="5633156" y="2949064"/>
-            <a:ext cx="1038576" cy="646331"/>
+              <a:t>Ona</a:t>
+            </a:r>
+          </a:p>
+        </p:txBody>
+      </p:sp>
+      <p:sp>
+        <p:nvSpPr>
+          <p:cNvPr id="21" name="Rectangle 20"/>
+          <p:cNvSpPr/>
+          <p:nvPr/>
+        </p:nvSpPr>
+        <p:spPr>
+          <a:xfrm>
+            <a:off x="3519689" y="5031889"/>
+            <a:ext cx="4944533" cy="1286934"/>
           </a:xfrm>
           <a:prstGeom prst="rect">
             <a:avLst/>
           </a:prstGeom>
-          <a:noFill/>
-        </p:spPr>
-        <p:txBody>
-          <a:bodyPr wrap="square" rtlCol="0">
-            <a:spAutoFit/>
-          </a:bodyPr>
-          <a:lstStyle/>
-          <a:p>
-            <a:r>
-              <a:rPr lang="en-AU" sz="3600" smtClean="0"/>
-              <a:t>OR</a:t>
-            </a:r>
-            <a:endParaRPr lang="en-AU" sz="3600" dirty="0">
-              <a:solidFill>
-                <a:schemeClr val="accent3">
-                  <a:lumMod val="20000"/>
-                  <a:lumOff val="80000"/>
-                </a:schemeClr>
-              </a:solidFill>
-            </a:endParaRPr>
+          <a:solidFill>
+            <a:srgbClr val="000000">
+              <a:alpha val="23137"/>
+            </a:srgbClr>
+          </a:solidFill>
+          <a:ln>
+            <a:noFill/>
+          </a:ln>
+        </p:spPr>
+        <p:style>
+          <a:lnRef idx="2">
+            <a:schemeClr val="accent1">
+              <a:shade val="50000"/>
+            </a:schemeClr>
+          </a:lnRef>
+          <a:fillRef idx="1">
+            <a:schemeClr val="accent1"/>
+          </a:fillRef>
+          <a:effectRef idx="0">
+            <a:schemeClr val="accent1"/>
+          </a:effectRef>
+          <a:fontRef idx="minor">
+            <a:schemeClr val="lt1"/>
+          </a:fontRef>
+        </p:style>
+        <p:txBody>
+          <a:bodyPr rtlCol="0" anchor="ctr"/>
+          <a:lstStyle/>
+          <a:p>
+            <a:pPr algn="ctr"/>
+            <a:endParaRPr lang="en-AU"/>
           </a:p>
         </p:txBody>
       </p:sp>
     </p:spTree>
     <p:extLst>
       <p:ext uri="{BB962C8B-B14F-4D97-AF65-F5344CB8AC3E}">
-        <p14:creationId xmlns:p14="http://schemas.microsoft.com/office/powerpoint/2010/main" val="531771315"/>
+        <p14:creationId xmlns:p14="http://schemas.microsoft.com/office/powerpoint/2010/main" val="77032568"/>
       </p:ext>
     </p:extLst>
   </p:cSld>
@@ -5383,156 +5395,15 @@
           <a:chExt cx="0" cy="0"/>
         </a:xfrm>
       </p:grpSpPr>
-      <p:sp>
-        <p:nvSpPr>
-          <p:cNvPr id="2" name="TextBox 1"/>
-          <p:cNvSpPr txBox="1"/>
-          <p:nvPr/>
-        </p:nvSpPr>
-        <p:spPr>
-          <a:xfrm>
-            <a:off x="957147" y="742229"/>
-            <a:ext cx="8636980" cy="769441"/>
-          </a:xfrm>
-          <a:prstGeom prst="rect">
-            <a:avLst/>
-          </a:prstGeom>
-          <a:noFill/>
-        </p:spPr>
-        <p:txBody>
-          <a:bodyPr wrap="none" rtlCol="0">
-            <a:spAutoFit/>
-          </a:bodyPr>
-          <a:lstStyle/>
-          <a:p>
-            <a:r>
-              <a:rPr lang="en-AU" sz="4400" dirty="0" smtClean="0">
-                <a:latin typeface="+mj-lt"/>
-              </a:rPr>
-              <a:t>automated data analysis/reporting</a:t>
-            </a:r>
-            <a:endParaRPr lang="en-AU" sz="4400" dirty="0">
-              <a:latin typeface="+mj-lt"/>
-            </a:endParaRPr>
-          </a:p>
-        </p:txBody>
-      </p:sp>
-      <p:sp>
-        <p:nvSpPr>
-          <p:cNvPr id="11" name="TextBox 10"/>
-          <p:cNvSpPr txBox="1"/>
-          <p:nvPr/>
-        </p:nvSpPr>
-        <p:spPr>
-          <a:xfrm>
-            <a:off x="5018197" y="4120562"/>
-            <a:ext cx="1586268" cy="615553"/>
-          </a:xfrm>
-          <a:prstGeom prst="rect">
-            <a:avLst/>
-          </a:prstGeom>
-          <a:noFill/>
-        </p:spPr>
-        <p:txBody>
-          <a:bodyPr wrap="none" rtlCol="0">
-            <a:spAutoFit/>
-          </a:bodyPr>
-          <a:lstStyle/>
-          <a:p>
-            <a:pPr algn="ctr"/>
-            <a:r>
-              <a:rPr lang="en-AU" sz="3400" smtClean="0">
-                <a:solidFill>
-                  <a:schemeClr val="accent3">
-                    <a:lumMod val="20000"/>
-                    <a:lumOff val="80000"/>
-                  </a:schemeClr>
-                </a:solidFill>
-                <a:latin typeface="+mj-lt"/>
-              </a:rPr>
-              <a:t>R Shiny</a:t>
-            </a:r>
-            <a:endParaRPr lang="en-AU" sz="3400" dirty="0" smtClean="0">
-              <a:solidFill>
-                <a:schemeClr val="accent3">
-                  <a:lumMod val="20000"/>
-                  <a:lumOff val="80000"/>
-                </a:schemeClr>
-              </a:solidFill>
-              <a:latin typeface="+mj-lt"/>
-            </a:endParaRPr>
-          </a:p>
-        </p:txBody>
-      </p:sp>
-      <p:sp>
-        <p:nvSpPr>
-          <p:cNvPr id="13" name="TextBox 12"/>
-          <p:cNvSpPr txBox="1"/>
-          <p:nvPr/>
-        </p:nvSpPr>
-        <p:spPr>
-          <a:xfrm>
-            <a:off x="7582565" y="4169162"/>
-            <a:ext cx="3410036" cy="584775"/>
-          </a:xfrm>
-          <a:prstGeom prst="rect">
-            <a:avLst/>
-          </a:prstGeom>
-          <a:noFill/>
-        </p:spPr>
-        <p:txBody>
-          <a:bodyPr wrap="none" rtlCol="0">
-            <a:spAutoFit/>
-          </a:bodyPr>
-          <a:lstStyle/>
-          <a:p>
-            <a:pPr algn="ctr"/>
-            <a:r>
-              <a:rPr lang="en-AU" sz="3200" dirty="0" smtClean="0"/>
-              <a:t>Microsoft Power BI</a:t>
-            </a:r>
-            <a:endParaRPr lang="en-AU" sz="3200" dirty="0"/>
-          </a:p>
-        </p:txBody>
-      </p:sp>
-      <p:sp>
-        <p:nvSpPr>
-          <p:cNvPr id="15" name="TextBox 14"/>
-          <p:cNvSpPr txBox="1"/>
-          <p:nvPr/>
-        </p:nvSpPr>
-        <p:spPr>
-          <a:xfrm>
-            <a:off x="2128723" y="4104645"/>
-            <a:ext cx="1541384" cy="584775"/>
-          </a:xfrm>
-          <a:prstGeom prst="rect">
-            <a:avLst/>
-          </a:prstGeom>
-          <a:noFill/>
-        </p:spPr>
-        <p:txBody>
-          <a:bodyPr wrap="none" rtlCol="0">
-            <a:spAutoFit/>
-          </a:bodyPr>
-          <a:lstStyle/>
-          <a:p>
-            <a:r>
-              <a:rPr lang="en-AU" sz="3200" dirty="0" smtClean="0"/>
-              <a:t>Tableau</a:t>
-            </a:r>
-          </a:p>
-        </p:txBody>
-      </p:sp>
       <p:pic>
         <p:nvPicPr>
-          <p:cNvPr id="4" name="Picture 3"/>
+          <p:cNvPr id="2" name="Picture 1"/>
           <p:cNvPicPr>
             <a:picLocks noChangeAspect="1"/>
           </p:cNvPicPr>
           <p:nvPr/>
         </p:nvPicPr>
-        <p:blipFill rotWithShape="1">
+        <p:blipFill>
           <a:blip r:embed="rId2" cstate="screen">
             <a:extLst>
               <a:ext uri="{28A0092B-C50C-407E-A947-70E740481C1C}">
@@ -5540,28 +5411,63 @@
               </a:ext>
             </a:extLst>
           </a:blip>
-          <a:srcRect/>
-          <a:stretch/>
+          <a:stretch>
+            <a:fillRect/>
+          </a:stretch>
         </p:blipFill>
         <p:spPr>
           <a:xfrm>
-            <a:off x="5245460" y="2741783"/>
-            <a:ext cx="1131742" cy="1097945"/>
+            <a:off x="9885467" y="4089348"/>
+            <a:ext cx="661260" cy="649214"/>
           </a:xfrm>
           <a:prstGeom prst="rect">
             <a:avLst/>
           </a:prstGeom>
         </p:spPr>
       </p:pic>
+      <p:sp>
+        <p:nvSpPr>
+          <p:cNvPr id="4" name="TextBox 3"/>
+          <p:cNvSpPr txBox="1"/>
+          <p:nvPr/>
+        </p:nvSpPr>
+        <p:spPr>
+          <a:xfrm>
+            <a:off x="957147" y="742229"/>
+            <a:ext cx="8965660" cy="769441"/>
+          </a:xfrm>
+          <a:prstGeom prst="rect">
+            <a:avLst/>
+          </a:prstGeom>
+          <a:noFill/>
+        </p:spPr>
+        <p:txBody>
+          <a:bodyPr wrap="none" rtlCol="0">
+            <a:spAutoFit/>
+          </a:bodyPr>
+          <a:lstStyle/>
+          <a:p>
+            <a:r>
+              <a:rPr lang="en-AU" sz="4400" dirty="0" smtClean="0">
+                <a:latin typeface="+mj-lt"/>
+              </a:rPr>
+              <a:t>sometimes paperless is not possible</a:t>
+            </a:r>
+            <a:endParaRPr lang="en-AU" sz="4400" dirty="0">
+              <a:latin typeface="+mj-lt"/>
+            </a:endParaRPr>
+          </a:p>
+        </p:txBody>
+      </p:sp>
       <p:pic>
         <p:nvPicPr>
-          <p:cNvPr id="6" name="Picture 5"/>
+          <p:cNvPr id="5" name="Picture 4"/>
           <p:cNvPicPr>
             <a:picLocks noChangeAspect="1"/>
           </p:cNvPicPr>
           <p:nvPr/>
         </p:nvPicPr>
-        <p:blipFill rotWithShape="1">
+        <p:blipFill>
           <a:blip r:embed="rId3" cstate="screen">
             <a:extLst>
               <a:ext uri="{28A0092B-C50C-407E-A947-70E740481C1C}">
@@ -5569,13 +5475,14 @@
               </a:ext>
             </a:extLst>
           </a:blip>
-          <a:srcRect/>
-          <a:stretch/>
+          <a:stretch>
+            <a:fillRect/>
+          </a:stretch>
         </p:blipFill>
         <p:spPr>
           <a:xfrm>
-            <a:off x="2230510" y="2531432"/>
-            <a:ext cx="1270668" cy="1307393"/>
+            <a:off x="7303500" y="4089348"/>
+            <a:ext cx="1247518" cy="645201"/>
           </a:xfrm>
           <a:prstGeom prst="rect">
             <a:avLst/>
@@ -5584,7 +5491,7 @@
       </p:pic>
       <p:pic>
         <p:nvPicPr>
-          <p:cNvPr id="16" name="Picture 15"/>
+          <p:cNvPr id="6" name="Picture 5"/>
           <p:cNvPicPr>
             <a:picLocks noChangeAspect="1"/>
           </p:cNvPicPr>
@@ -5604,8 +5511,8 @@
         </p:blipFill>
         <p:spPr>
           <a:xfrm>
-            <a:off x="8612563" y="2587877"/>
-            <a:ext cx="1349381" cy="1349381"/>
+            <a:off x="8844543" y="4089348"/>
+            <a:ext cx="703515" cy="725793"/>
           </a:xfrm>
           <a:prstGeom prst="rect">
             <a:avLst/>
@@ -5614,14 +5521,14 @@
       </p:pic>
       <p:sp>
         <p:nvSpPr>
-          <p:cNvPr id="17" name="TextBox 16"/>
+          <p:cNvPr id="7" name="TextBox 6"/>
           <p:cNvSpPr txBox="1"/>
           <p:nvPr/>
         </p:nvSpPr>
         <p:spPr>
           <a:xfrm>
-            <a:off x="5565109" y="5442378"/>
-            <a:ext cx="492443" cy="584775"/>
+            <a:off x="7506702" y="2733620"/>
+            <a:ext cx="3082087" cy="1077218"/>
           </a:xfrm>
           <a:prstGeom prst="rect">
             <a:avLst/>
@@ -5629,22 +5536,111 @@
           <a:noFill/>
         </p:spPr>
         <p:txBody>
-          <a:bodyPr wrap="none" rtlCol="0">
+          <a:bodyPr wrap="square" rtlCol="0">
             <a:spAutoFit/>
           </a:bodyPr>
           <a:lstStyle/>
           <a:p>
             <a:r>
+              <a:rPr lang="en-AU" sz="3200" dirty="0" smtClean="0">
+                <a:solidFill>
+                  <a:schemeClr val="accent3">
+                    <a:lumMod val="20000"/>
+                    <a:lumOff val="80000"/>
+                  </a:schemeClr>
+                </a:solidFill>
+              </a:rPr>
+              <a:t>store your data in a database</a:t>
+            </a:r>
+            <a:endParaRPr lang="en-AU" sz="3200" dirty="0">
+              <a:solidFill>
+                <a:schemeClr val="accent3">
+                  <a:lumMod val="20000"/>
+                  <a:lumOff val="80000"/>
+                </a:schemeClr>
+              </a:solidFill>
+            </a:endParaRPr>
+          </a:p>
+        </p:txBody>
+      </p:sp>
+      <p:sp>
+        <p:nvSpPr>
+          <p:cNvPr id="8" name="TextBox 7"/>
+          <p:cNvSpPr txBox="1"/>
+          <p:nvPr/>
+        </p:nvSpPr>
+        <p:spPr>
+          <a:xfrm>
+            <a:off x="1353369" y="2577989"/>
+            <a:ext cx="3444817" cy="1569660"/>
+          </a:xfrm>
+          <a:prstGeom prst="rect">
+            <a:avLst/>
+          </a:prstGeom>
+          <a:noFill/>
+        </p:spPr>
+        <p:txBody>
+          <a:bodyPr wrap="square" rtlCol="0">
+            <a:spAutoFit/>
+          </a:bodyPr>
+          <a:lstStyle/>
+          <a:p>
+            <a:r>
               <a:rPr lang="en-AU" sz="3200" dirty="0" smtClean="0"/>
-              <a:t>…</a:t>
-            </a:r>
+              <a:t>you can still use one of the form tools to enter data</a:t>
+            </a:r>
+            <a:endParaRPr lang="en-AU" sz="3200" dirty="0">
+              <a:solidFill>
+                <a:schemeClr val="accent3">
+                  <a:lumMod val="20000"/>
+                  <a:lumOff val="80000"/>
+                </a:schemeClr>
+              </a:solidFill>
+            </a:endParaRPr>
+          </a:p>
+        </p:txBody>
+      </p:sp>
+      <p:sp>
+        <p:nvSpPr>
+          <p:cNvPr id="9" name="TextBox 8"/>
+          <p:cNvSpPr txBox="1"/>
+          <p:nvPr/>
+        </p:nvSpPr>
+        <p:spPr>
+          <a:xfrm>
+            <a:off x="5633156" y="2949064"/>
+            <a:ext cx="1038576" cy="646331"/>
+          </a:xfrm>
+          <a:prstGeom prst="rect">
+            <a:avLst/>
+          </a:prstGeom>
+          <a:noFill/>
+        </p:spPr>
+        <p:txBody>
+          <a:bodyPr wrap="square" rtlCol="0">
+            <a:spAutoFit/>
+          </a:bodyPr>
+          <a:lstStyle/>
+          <a:p>
+            <a:r>
+              <a:rPr lang="en-AU" sz="3600" smtClean="0"/>
+              <a:t>OR</a:t>
+            </a:r>
+            <a:endParaRPr lang="en-AU" sz="3600" dirty="0">
+              <a:solidFill>
+                <a:schemeClr val="accent3">
+                  <a:lumMod val="20000"/>
+                  <a:lumOff val="80000"/>
+                </a:schemeClr>
+              </a:solidFill>
+            </a:endParaRPr>
           </a:p>
         </p:txBody>
       </p:sp>
     </p:spTree>
     <p:extLst>
       <p:ext uri="{BB962C8B-B14F-4D97-AF65-F5344CB8AC3E}">
-        <p14:creationId xmlns:p14="http://schemas.microsoft.com/office/powerpoint/2010/main" val="846216461"/>
+        <p14:creationId xmlns:p14="http://schemas.microsoft.com/office/powerpoint/2010/main" val="531771315"/>
       </p:ext>
     </p:extLst>
   </p:cSld>
@@ -5939,7 +5935,7 @@
     </p:spTree>
     <p:extLst>
       <p:ext uri="{BB962C8B-B14F-4D97-AF65-F5344CB8AC3E}">
-        <p14:creationId xmlns:p14="http://schemas.microsoft.com/office/powerpoint/2010/main" val="1546919609"/>
+        <p14:creationId xmlns:p14="http://schemas.microsoft.com/office/powerpoint/2010/main" val="846216461"/>
       </p:ext>
     </p:extLst>
   </p:cSld>
@@ -5975,6 +5971,301 @@
       </p:grpSpPr>
       <p:sp>
         <p:nvSpPr>
+          <p:cNvPr id="2" name="TextBox 1"/>
+          <p:cNvSpPr txBox="1"/>
+          <p:nvPr/>
+        </p:nvSpPr>
+        <p:spPr>
+          <a:xfrm>
+            <a:off x="957147" y="742229"/>
+            <a:ext cx="8636980" cy="769441"/>
+          </a:xfrm>
+          <a:prstGeom prst="rect">
+            <a:avLst/>
+          </a:prstGeom>
+          <a:noFill/>
+        </p:spPr>
+        <p:txBody>
+          <a:bodyPr wrap="none" rtlCol="0">
+            <a:spAutoFit/>
+          </a:bodyPr>
+          <a:lstStyle/>
+          <a:p>
+            <a:r>
+              <a:rPr lang="en-AU" sz="4400" dirty="0" smtClean="0">
+                <a:latin typeface="+mj-lt"/>
+              </a:rPr>
+              <a:t>automated data analysis/reporting</a:t>
+            </a:r>
+            <a:endParaRPr lang="en-AU" sz="4400" dirty="0">
+              <a:latin typeface="+mj-lt"/>
+            </a:endParaRPr>
+          </a:p>
+        </p:txBody>
+      </p:sp>
+      <p:sp>
+        <p:nvSpPr>
+          <p:cNvPr id="11" name="TextBox 10"/>
+          <p:cNvSpPr txBox="1"/>
+          <p:nvPr/>
+        </p:nvSpPr>
+        <p:spPr>
+          <a:xfrm>
+            <a:off x="5018197" y="4120562"/>
+            <a:ext cx="1586268" cy="615553"/>
+          </a:xfrm>
+          <a:prstGeom prst="rect">
+            <a:avLst/>
+          </a:prstGeom>
+          <a:noFill/>
+        </p:spPr>
+        <p:txBody>
+          <a:bodyPr wrap="none" rtlCol="0">
+            <a:spAutoFit/>
+          </a:bodyPr>
+          <a:lstStyle/>
+          <a:p>
+            <a:pPr algn="ctr"/>
+            <a:r>
+              <a:rPr lang="en-AU" sz="3400" smtClean="0">
+                <a:solidFill>
+                  <a:schemeClr val="accent3">
+                    <a:lumMod val="20000"/>
+                    <a:lumOff val="80000"/>
+                  </a:schemeClr>
+                </a:solidFill>
+                <a:latin typeface="+mj-lt"/>
+              </a:rPr>
+              <a:t>R Shiny</a:t>
+            </a:r>
+            <a:endParaRPr lang="en-AU" sz="3400" dirty="0" smtClean="0">
+              <a:solidFill>
+                <a:schemeClr val="accent3">
+                  <a:lumMod val="20000"/>
+                  <a:lumOff val="80000"/>
+                </a:schemeClr>
+              </a:solidFill>
+              <a:latin typeface="+mj-lt"/>
+            </a:endParaRPr>
+          </a:p>
+        </p:txBody>
+      </p:sp>
+      <p:sp>
+        <p:nvSpPr>
+          <p:cNvPr id="13" name="TextBox 12"/>
+          <p:cNvSpPr txBox="1"/>
+          <p:nvPr/>
+        </p:nvSpPr>
+        <p:spPr>
+          <a:xfrm>
+            <a:off x="7582565" y="4169162"/>
+            <a:ext cx="3410036" cy="584775"/>
+          </a:xfrm>
+          <a:prstGeom prst="rect">
+            <a:avLst/>
+          </a:prstGeom>
+          <a:noFill/>
+        </p:spPr>
+        <p:txBody>
+          <a:bodyPr wrap="none" rtlCol="0">
+            <a:spAutoFit/>
+          </a:bodyPr>
+          <a:lstStyle/>
+          <a:p>
+            <a:pPr algn="ctr"/>
+            <a:r>
+              <a:rPr lang="en-AU" sz="3200" dirty="0" smtClean="0"/>
+              <a:t>Microsoft Power BI</a:t>
+            </a:r>
+            <a:endParaRPr lang="en-AU" sz="3200" dirty="0"/>
+          </a:p>
+        </p:txBody>
+      </p:sp>
+      <p:sp>
+        <p:nvSpPr>
+          <p:cNvPr id="15" name="TextBox 14"/>
+          <p:cNvSpPr txBox="1"/>
+          <p:nvPr/>
+        </p:nvSpPr>
+        <p:spPr>
+          <a:xfrm>
+            <a:off x="2128723" y="4104645"/>
+            <a:ext cx="1541384" cy="584775"/>
+          </a:xfrm>
+          <a:prstGeom prst="rect">
+            <a:avLst/>
+          </a:prstGeom>
+          <a:noFill/>
+        </p:spPr>
+        <p:txBody>
+          <a:bodyPr wrap="none" rtlCol="0">
+            <a:spAutoFit/>
+          </a:bodyPr>
+          <a:lstStyle/>
+          <a:p>
+            <a:r>
+              <a:rPr lang="en-AU" sz="3200" dirty="0" smtClean="0"/>
+              <a:t>Tableau</a:t>
+            </a:r>
+          </a:p>
+        </p:txBody>
+      </p:sp>
+      <p:pic>
+        <p:nvPicPr>
+          <p:cNvPr id="4" name="Picture 3"/>
+          <p:cNvPicPr>
+            <a:picLocks noChangeAspect="1"/>
+          </p:cNvPicPr>
+          <p:nvPr/>
+        </p:nvPicPr>
+        <p:blipFill rotWithShape="1">
+          <a:blip r:embed="rId2" cstate="screen">
+            <a:extLst>
+              <a:ext uri="{28A0092B-C50C-407E-A947-70E740481C1C}">
+                <a14:useLocalDpi xmlns:a14="http://schemas.microsoft.com/office/drawing/2010/main"/>
+              </a:ext>
+            </a:extLst>
+          </a:blip>
+          <a:srcRect/>
+          <a:stretch/>
+        </p:blipFill>
+        <p:spPr>
+          <a:xfrm>
+            <a:off x="5245460" y="2741783"/>
+            <a:ext cx="1131742" cy="1097945"/>
+          </a:xfrm>
+          <a:prstGeom prst="rect">
+            <a:avLst/>
+          </a:prstGeom>
+        </p:spPr>
+      </p:pic>
+      <p:pic>
+        <p:nvPicPr>
+          <p:cNvPr id="6" name="Picture 5"/>
+          <p:cNvPicPr>
+            <a:picLocks noChangeAspect="1"/>
+          </p:cNvPicPr>
+          <p:nvPr/>
+        </p:nvPicPr>
+        <p:blipFill rotWithShape="1">
+          <a:blip r:embed="rId3" cstate="screen">
+            <a:extLst>
+              <a:ext uri="{28A0092B-C50C-407E-A947-70E740481C1C}">
+                <a14:useLocalDpi xmlns:a14="http://schemas.microsoft.com/office/drawing/2010/main"/>
+              </a:ext>
+            </a:extLst>
+          </a:blip>
+          <a:srcRect/>
+          <a:stretch/>
+        </p:blipFill>
+        <p:spPr>
+          <a:xfrm>
+            <a:off x="2230510" y="2531432"/>
+            <a:ext cx="1270668" cy="1307393"/>
+          </a:xfrm>
+          <a:prstGeom prst="rect">
+            <a:avLst/>
+          </a:prstGeom>
+        </p:spPr>
+      </p:pic>
+      <p:pic>
+        <p:nvPicPr>
+          <p:cNvPr id="16" name="Picture 15"/>
+          <p:cNvPicPr>
+            <a:picLocks noChangeAspect="1"/>
+          </p:cNvPicPr>
+          <p:nvPr/>
+        </p:nvPicPr>
+        <p:blipFill>
+          <a:blip r:embed="rId4" cstate="screen">
+            <a:extLst>
+              <a:ext uri="{28A0092B-C50C-407E-A947-70E740481C1C}">
+                <a14:useLocalDpi xmlns:a14="http://schemas.microsoft.com/office/drawing/2010/main"/>
+              </a:ext>
+            </a:extLst>
+          </a:blip>
+          <a:stretch>
+            <a:fillRect/>
+          </a:stretch>
+        </p:blipFill>
+        <p:spPr>
+          <a:xfrm>
+            <a:off x="8612563" y="2587877"/>
+            <a:ext cx="1349381" cy="1349381"/>
+          </a:xfrm>
+          <a:prstGeom prst="rect">
+            <a:avLst/>
+          </a:prstGeom>
+        </p:spPr>
+      </p:pic>
+      <p:sp>
+        <p:nvSpPr>
+          <p:cNvPr id="17" name="TextBox 16"/>
+          <p:cNvSpPr txBox="1"/>
+          <p:nvPr/>
+        </p:nvSpPr>
+        <p:spPr>
+          <a:xfrm>
+            <a:off x="5565109" y="5442378"/>
+            <a:ext cx="492443" cy="584775"/>
+          </a:xfrm>
+          <a:prstGeom prst="rect">
+            <a:avLst/>
+          </a:prstGeom>
+          <a:noFill/>
+        </p:spPr>
+        <p:txBody>
+          <a:bodyPr wrap="none" rtlCol="0">
+            <a:spAutoFit/>
+          </a:bodyPr>
+          <a:lstStyle/>
+          <a:p>
+            <a:r>
+              <a:rPr lang="en-AU" sz="3200" dirty="0" smtClean="0"/>
+              <a:t>…</a:t>
+            </a:r>
+          </a:p>
+        </p:txBody>
+      </p:sp>
+    </p:spTree>
+    <p:extLst>
+      <p:ext uri="{BB962C8B-B14F-4D97-AF65-F5344CB8AC3E}">
+        <p14:creationId xmlns:p14="http://schemas.microsoft.com/office/powerpoint/2010/main" val="1546919609"/>
+      </p:ext>
+    </p:extLst>
+  </p:cSld>
+  <p:clrMapOvr>
+    <a:masterClrMapping/>
+  </p:clrMapOvr>
+  <p:timing>
+    <p:tnLst>
+      <p:par>
+        <p:cTn id="1" dur="indefinite" restart="never" nodeType="tmRoot"/>
+      </p:par>
+    </p:tnLst>
+  </p:timing>
+</p:sld>
+</file>
+
+<file path=ppt/slides/slide18.xml><?xml version="1.0" encoding="utf-8"?>
+<p:sld xmlns:a="http://schemas.openxmlformats.org/drawingml/2006/main" xmlns:r="http://schemas.openxmlformats.org/officeDocument/2006/relationships" xmlns:p="http://schemas.openxmlformats.org/presentationml/2006/main">
+  <p:cSld>
+    <p:spTree>
+      <p:nvGrpSpPr>
+        <p:cNvPr id="1" name=""/>
+        <p:cNvGrpSpPr/>
+        <p:nvPr/>
+      </p:nvGrpSpPr>
+      <p:grpSpPr>
+        <a:xfrm>
+          <a:off x="0" y="0"/>
+          <a:ext cx="0" cy="0"/>
+          <a:chOff x="0" y="0"/>
+          <a:chExt cx="0" cy="0"/>
+        </a:xfrm>
+      </p:grpSpPr>
+      <p:sp>
+        <p:nvSpPr>
           <p:cNvPr id="5" name="TextBox 4"/>
           <p:cNvSpPr txBox="1"/>
           <p:nvPr/>
@@ -6131,7 +6422,7 @@
 </p:sld>
 </file>
 
-<file path=ppt/slides/slide18.xml><?xml version="1.0" encoding="utf-8"?>
+<file path=ppt/slides/slide19.xml><?xml version="1.0" encoding="utf-8"?>
 <p:sld xmlns:a="http://schemas.openxmlformats.org/drawingml/2006/main" xmlns:r="http://schemas.openxmlformats.org/officeDocument/2006/relationships" xmlns:p="http://schemas.openxmlformats.org/presentationml/2006/main">
   <p:cSld>
     <p:bg>
@@ -8973,14 +9264,14 @@
       </p:grpSpPr>
       <p:sp>
         <p:nvSpPr>
-          <p:cNvPr id="3" name="TextBox 2"/>
+          <p:cNvPr id="7" name="TextBox 6"/>
           <p:cNvSpPr txBox="1"/>
           <p:nvPr/>
         </p:nvSpPr>
         <p:spPr>
           <a:xfrm>
-            <a:off x="2101511" y="1988076"/>
-            <a:ext cx="2754216" cy="523220"/>
+            <a:off x="3018200" y="2947529"/>
+            <a:ext cx="5830955" cy="830997"/>
           </a:xfrm>
           <a:prstGeom prst="rect">
             <a:avLst/>
@@ -8993,45 +9284,33 @@
           </a:bodyPr>
           <a:lstStyle/>
           <a:p>
-            <a:r>
-              <a:rPr lang="en-AU" sz="2800" dirty="0" smtClean="0">
-                <a:solidFill>
-                  <a:schemeClr val="bg2">
-                    <a:lumMod val="20000"/>
-                    <a:lumOff val="80000"/>
-                  </a:schemeClr>
-                </a:solidFill>
-              </a:rPr>
-              <a:t>less</a:t>
-            </a:r>
-            <a:r>
-              <a:rPr lang="en-AU" sz="2800" dirty="0" smtClean="0">
-                <a:solidFill>
-                  <a:schemeClr val="accent3">
-                    <a:lumMod val="20000"/>
-                    <a:lumOff val="80000"/>
-                  </a:schemeClr>
-                </a:solidFill>
-              </a:rPr>
-              <a:t> </a:t>
-            </a:r>
-            <a:r>
-              <a:rPr lang="en-AU" sz="2800" dirty="0" smtClean="0"/>
-              <a:t>human error</a:t>
-            </a:r>
-          </a:p>
-        </p:txBody>
-      </p:sp>
-      <p:sp>
-        <p:nvSpPr>
-          <p:cNvPr id="6" name="TextBox 5"/>
+            <a:pPr algn="ctr"/>
+            <a:r>
+              <a:rPr lang="en-US" sz="4800" b="1" dirty="0" err="1" smtClean="0"/>
+              <a:t>tinyurl.com</a:t>
+            </a:r>
+            <a:r>
+              <a:rPr lang="en-US" sz="4800" b="1" dirty="0" smtClean="0"/>
+              <a:t>/</a:t>
+            </a:r>
+            <a:r>
+              <a:rPr lang="en-US" sz="4800" b="1" dirty="0" err="1" smtClean="0"/>
+              <a:t>iccbdemo</a:t>
+            </a:r>
+            <a:endParaRPr lang="en-AU" sz="4800" dirty="0"/>
+          </a:p>
+        </p:txBody>
+      </p:sp>
+      <p:sp>
+        <p:nvSpPr>
+          <p:cNvPr id="8" name="TextBox 7"/>
           <p:cNvSpPr txBox="1"/>
           <p:nvPr/>
         </p:nvSpPr>
         <p:spPr>
           <a:xfrm>
-            <a:off x="1371599" y="3138506"/>
-            <a:ext cx="4214039" cy="523220"/>
+            <a:off x="4645792" y="2458238"/>
+            <a:ext cx="2575770" cy="584775"/>
           </a:xfrm>
           <a:prstGeom prst="rect">
             <a:avLst/>
@@ -9045,41 +9324,23 @@
           <a:lstStyle/>
           <a:p>
             <a:r>
-              <a:rPr lang="en-AU" sz="2800" dirty="0" smtClean="0"/>
-              <a:t>there is </a:t>
-            </a:r>
-            <a:r>
-              <a:rPr lang="en-AU" sz="2800" dirty="0" smtClean="0">
-                <a:solidFill>
-                  <a:schemeClr val="bg2">
-                    <a:lumMod val="20000"/>
-                    <a:lumOff val="80000"/>
-                  </a:schemeClr>
-                </a:solidFill>
-              </a:rPr>
-              <a:t>constant feedback</a:t>
-            </a:r>
-            <a:endParaRPr lang="en-AU" sz="2800" dirty="0">
-              <a:solidFill>
-                <a:schemeClr val="bg2">
-                  <a:lumMod val="20000"/>
-                  <a:lumOff val="80000"/>
-                </a:schemeClr>
-              </a:solidFill>
-            </a:endParaRPr>
-          </a:p>
-        </p:txBody>
-      </p:sp>
-      <p:sp>
-        <p:nvSpPr>
-          <p:cNvPr id="7" name="TextBox 6"/>
+              <a:rPr lang="en-AU" sz="3200" dirty="0" smtClean="0"/>
+              <a:t>fill in the form</a:t>
+            </a:r>
+            <a:endParaRPr lang="en-AU" sz="3200" dirty="0"/>
+          </a:p>
+        </p:txBody>
+      </p:sp>
+      <p:sp>
+        <p:nvSpPr>
+          <p:cNvPr id="9" name="TextBox 8"/>
           <p:cNvSpPr txBox="1"/>
           <p:nvPr/>
         </p:nvSpPr>
         <p:spPr>
           <a:xfrm>
-            <a:off x="7200136" y="3321422"/>
-            <a:ext cx="3700052" cy="707886"/>
+            <a:off x="4047009" y="3778526"/>
+            <a:ext cx="3773341" cy="523220"/>
           </a:xfrm>
           <a:prstGeom prst="rect">
             <a:avLst/>
@@ -9094,140 +9355,17 @@
           <a:p>
             <a:pPr algn="ctr"/>
             <a:r>
-              <a:rPr lang="en-AU" sz="4000" dirty="0" smtClean="0"/>
-              <a:t>decision making</a:t>
-            </a:r>
-            <a:endParaRPr lang="en-AU" sz="4000" dirty="0"/>
-          </a:p>
-        </p:txBody>
-      </p:sp>
-      <p:sp>
-        <p:nvSpPr>
-          <p:cNvPr id="9" name="TextBox 8"/>
-          <p:cNvSpPr txBox="1"/>
-          <p:nvPr/>
-        </p:nvSpPr>
-        <p:spPr>
-          <a:xfrm>
-            <a:off x="1111947" y="4288936"/>
-            <a:ext cx="4733347" cy="523220"/>
-          </a:xfrm>
-          <a:prstGeom prst="rect">
-            <a:avLst/>
-          </a:prstGeom>
-          <a:noFill/>
-        </p:spPr>
-        <p:txBody>
-          <a:bodyPr wrap="none" rtlCol="0">
-            <a:spAutoFit/>
-          </a:bodyPr>
-          <a:lstStyle/>
-          <a:p>
-            <a:pPr algn="ctr"/>
-            <a:r>
               <a:rPr lang="en-AU" sz="2800" dirty="0" smtClean="0"/>
-              <a:t>errors can be quickly detected</a:t>
+              <a:t>on your laptop or phone</a:t>
             </a:r>
             <a:endParaRPr lang="en-AU" sz="2800" dirty="0"/>
-          </a:p>
-        </p:txBody>
-      </p:sp>
-      <p:sp>
-        <p:nvSpPr>
-          <p:cNvPr id="11" name="Rectangle 10"/>
-          <p:cNvSpPr/>
-          <p:nvPr/>
-        </p:nvSpPr>
-        <p:spPr>
-          <a:xfrm>
-            <a:off x="7086017" y="2551981"/>
-            <a:ext cx="1722074" cy="769441"/>
-          </a:xfrm>
-          <a:prstGeom prst="rect">
-            <a:avLst/>
-          </a:prstGeom>
-        </p:spPr>
-        <p:txBody>
-          <a:bodyPr wrap="none">
-            <a:spAutoFit/>
-          </a:bodyPr>
-          <a:lstStyle/>
-          <a:p>
-            <a:pPr algn="ctr"/>
-            <a:r>
-              <a:rPr lang="en-AU" sz="4400" dirty="0" smtClean="0">
-                <a:solidFill>
-                  <a:schemeClr val="accent6">
-                    <a:lumMod val="20000"/>
-                    <a:lumOff val="80000"/>
-                  </a:schemeClr>
-                </a:solidFill>
-                <a:latin typeface="+mj-lt"/>
-              </a:rPr>
-              <a:t>faster </a:t>
-            </a:r>
-            <a:endParaRPr lang="en-AU" sz="4400" dirty="0">
-              <a:solidFill>
-                <a:schemeClr val="accent6">
-                  <a:lumMod val="20000"/>
-                  <a:lumOff val="80000"/>
-                </a:schemeClr>
-              </a:solidFill>
-              <a:latin typeface="+mj-lt"/>
-            </a:endParaRPr>
-          </a:p>
-        </p:txBody>
-      </p:sp>
-      <p:sp>
-        <p:nvSpPr>
-          <p:cNvPr id="12" name="Rectangle 11"/>
-          <p:cNvSpPr/>
-          <p:nvPr/>
-        </p:nvSpPr>
-        <p:spPr>
-          <a:xfrm>
-            <a:off x="8808091" y="2551981"/>
-            <a:ext cx="2145780" cy="769441"/>
-          </a:xfrm>
-          <a:prstGeom prst="rect">
-            <a:avLst/>
-          </a:prstGeom>
-        </p:spPr>
-        <p:txBody>
-          <a:bodyPr wrap="none">
-            <a:spAutoFit/>
-          </a:bodyPr>
-          <a:lstStyle/>
-          <a:p>
-            <a:pPr algn="ctr"/>
-            <a:r>
-              <a:rPr lang="en-AU" sz="4400" dirty="0" smtClean="0">
-                <a:solidFill>
-                  <a:schemeClr val="accent6">
-                    <a:lumMod val="20000"/>
-                    <a:lumOff val="80000"/>
-                  </a:schemeClr>
-                </a:solidFill>
-                <a:latin typeface="+mj-lt"/>
-              </a:rPr>
-              <a:t>cheaper</a:t>
-            </a:r>
-            <a:endParaRPr lang="en-AU" sz="4400" dirty="0">
-              <a:solidFill>
-                <a:schemeClr val="accent6">
-                  <a:lumMod val="20000"/>
-                  <a:lumOff val="80000"/>
-                </a:schemeClr>
-              </a:solidFill>
-              <a:latin typeface="+mj-lt"/>
-            </a:endParaRPr>
           </a:p>
         </p:txBody>
       </p:sp>
     </p:spTree>
     <p:extLst>
       <p:ext uri="{BB962C8B-B14F-4D97-AF65-F5344CB8AC3E}">
-        <p14:creationId xmlns:p14="http://schemas.microsoft.com/office/powerpoint/2010/main" val="1121806212"/>
+        <p14:creationId xmlns:p14="http://schemas.microsoft.com/office/powerpoint/2010/main" val="1485777251"/>
       </p:ext>
     </p:extLst>
   </p:cSld>

</xml_diff>